<commit_message>
Before fixing review comments
Signed-off-by: Van Cam PHAM <phamvancam2104@gmail.com>
</commit_message>
<xml_diff>
--- a/figures/modelchange.pptx
+++ b/figures/modelchange.pptx
@@ -243,7 +243,7 @@
           <a:p>
             <a:fld id="{E46C7458-0CDA-4E00-96CD-35DB9DC1AB11}" type="datetimeFigureOut">
               <a:rPr lang="fr-FR" smtClean="0"/>
-              <a:t>26/08/2016</a:t>
+              <a:t>27/09/2016</a:t>
             </a:fld>
             <a:endParaRPr lang="fr-FR"/>
           </a:p>
@@ -413,7 +413,7 @@
           <a:p>
             <a:fld id="{E46C7458-0CDA-4E00-96CD-35DB9DC1AB11}" type="datetimeFigureOut">
               <a:rPr lang="fr-FR" smtClean="0"/>
-              <a:t>26/08/2016</a:t>
+              <a:t>27/09/2016</a:t>
             </a:fld>
             <a:endParaRPr lang="fr-FR"/>
           </a:p>
@@ -593,7 +593,7 @@
           <a:p>
             <a:fld id="{E46C7458-0CDA-4E00-96CD-35DB9DC1AB11}" type="datetimeFigureOut">
               <a:rPr lang="fr-FR" smtClean="0"/>
-              <a:t>26/08/2016</a:t>
+              <a:t>27/09/2016</a:t>
             </a:fld>
             <a:endParaRPr lang="fr-FR"/>
           </a:p>
@@ -763,7 +763,7 @@
           <a:p>
             <a:fld id="{E46C7458-0CDA-4E00-96CD-35DB9DC1AB11}" type="datetimeFigureOut">
               <a:rPr lang="fr-FR" smtClean="0"/>
-              <a:t>26/08/2016</a:t>
+              <a:t>27/09/2016</a:t>
             </a:fld>
             <a:endParaRPr lang="fr-FR"/>
           </a:p>
@@ -1009,7 +1009,7 @@
           <a:p>
             <a:fld id="{E46C7458-0CDA-4E00-96CD-35DB9DC1AB11}" type="datetimeFigureOut">
               <a:rPr lang="fr-FR" smtClean="0"/>
-              <a:t>26/08/2016</a:t>
+              <a:t>27/09/2016</a:t>
             </a:fld>
             <a:endParaRPr lang="fr-FR"/>
           </a:p>
@@ -1241,7 +1241,7 @@
           <a:p>
             <a:fld id="{E46C7458-0CDA-4E00-96CD-35DB9DC1AB11}" type="datetimeFigureOut">
               <a:rPr lang="fr-FR" smtClean="0"/>
-              <a:t>26/08/2016</a:t>
+              <a:t>27/09/2016</a:t>
             </a:fld>
             <a:endParaRPr lang="fr-FR"/>
           </a:p>
@@ -1608,7 +1608,7 @@
           <a:p>
             <a:fld id="{E46C7458-0CDA-4E00-96CD-35DB9DC1AB11}" type="datetimeFigureOut">
               <a:rPr lang="fr-FR" smtClean="0"/>
-              <a:t>26/08/2016</a:t>
+              <a:t>27/09/2016</a:t>
             </a:fld>
             <a:endParaRPr lang="fr-FR"/>
           </a:p>
@@ -1726,7 +1726,7 @@
           <a:p>
             <a:fld id="{E46C7458-0CDA-4E00-96CD-35DB9DC1AB11}" type="datetimeFigureOut">
               <a:rPr lang="fr-FR" smtClean="0"/>
-              <a:t>26/08/2016</a:t>
+              <a:t>27/09/2016</a:t>
             </a:fld>
             <a:endParaRPr lang="fr-FR"/>
           </a:p>
@@ -1821,7 +1821,7 @@
           <a:p>
             <a:fld id="{E46C7458-0CDA-4E00-96CD-35DB9DC1AB11}" type="datetimeFigureOut">
               <a:rPr lang="fr-FR" smtClean="0"/>
-              <a:t>26/08/2016</a:t>
+              <a:t>27/09/2016</a:t>
             </a:fld>
             <a:endParaRPr lang="fr-FR"/>
           </a:p>
@@ -2098,7 +2098,7 @@
           <a:p>
             <a:fld id="{E46C7458-0CDA-4E00-96CD-35DB9DC1AB11}" type="datetimeFigureOut">
               <a:rPr lang="fr-FR" smtClean="0"/>
-              <a:t>26/08/2016</a:t>
+              <a:t>27/09/2016</a:t>
             </a:fld>
             <a:endParaRPr lang="fr-FR"/>
           </a:p>
@@ -2351,7 +2351,7 @@
           <a:p>
             <a:fld id="{E46C7458-0CDA-4E00-96CD-35DB9DC1AB11}" type="datetimeFigureOut">
               <a:rPr lang="fr-FR" smtClean="0"/>
-              <a:t>26/08/2016</a:t>
+              <a:t>27/09/2016</a:t>
             </a:fld>
             <a:endParaRPr lang="fr-FR"/>
           </a:p>
@@ -2564,7 +2564,7 @@
           <a:p>
             <a:fld id="{E46C7458-0CDA-4E00-96CD-35DB9DC1AB11}" type="datetimeFigureOut">
               <a:rPr lang="fr-FR" smtClean="0"/>
-              <a:t>26/08/2016</a:t>
+              <a:t>27/09/2016</a:t>
             </a:fld>
             <a:endParaRPr lang="fr-FR"/>
           </a:p>
@@ -2977,10 +2977,10 @@
         </p:nvGrpSpPr>
         <p:grpSpPr>
           <a:xfrm>
-            <a:off x="106077" y="84967"/>
-            <a:ext cx="10630655" cy="5249206"/>
-            <a:chOff x="267445" y="766286"/>
-            <a:chExt cx="10630655" cy="5249206"/>
+            <a:off x="106077" y="25698"/>
+            <a:ext cx="10630655" cy="4216245"/>
+            <a:chOff x="267445" y="952560"/>
+            <a:chExt cx="10630655" cy="4216245"/>
           </a:xfrm>
         </p:grpSpPr>
         <p:grpSp>
@@ -2991,10 +2991,10 @@
           </p:nvGrpSpPr>
           <p:grpSpPr>
             <a:xfrm>
-              <a:off x="267445" y="766286"/>
-              <a:ext cx="7370478" cy="5249206"/>
-              <a:chOff x="1083233" y="1516902"/>
-              <a:chExt cx="7370478" cy="5249206"/>
+              <a:off x="267445" y="952560"/>
+              <a:ext cx="7370478" cy="4216245"/>
+              <a:chOff x="1083233" y="1703176"/>
+              <a:chExt cx="7370478" cy="4216245"/>
             </a:xfrm>
           </p:grpSpPr>
           <p:grpSp>
@@ -3005,10 +3005,10 @@
             </p:nvGrpSpPr>
             <p:grpSpPr>
               <a:xfrm>
-                <a:off x="1083233" y="1516902"/>
-                <a:ext cx="7370478" cy="5249206"/>
-                <a:chOff x="1083233" y="1516902"/>
-                <a:chExt cx="7370478" cy="5249206"/>
+                <a:off x="1083233" y="1703176"/>
+                <a:ext cx="7370478" cy="4216245"/>
+                <a:chOff x="1083233" y="1703176"/>
+                <a:chExt cx="7370478" cy="4216245"/>
               </a:xfrm>
             </p:grpSpPr>
             <p:sp>
@@ -3178,7 +3178,7 @@
               </p:nvSpPr>
               <p:spPr>
                 <a:xfrm>
-                  <a:off x="3611284" y="1876608"/>
+                  <a:off x="3611284" y="2054415"/>
                   <a:ext cx="1166906" cy="508001"/>
                 </a:xfrm>
                 <a:prstGeom prst="rect">
@@ -3231,7 +3231,7 @@
               </p:nvSpPr>
               <p:spPr>
                 <a:xfrm>
-                  <a:off x="3620249" y="2853766"/>
+                  <a:off x="3620249" y="2752162"/>
                   <a:ext cx="1166906" cy="508001"/>
                 </a:xfrm>
                 <a:prstGeom prst="rect">
@@ -3284,7 +3284,7 @@
               </p:nvSpPr>
               <p:spPr>
                 <a:xfrm>
-                  <a:off x="3629212" y="3427505"/>
+                  <a:off x="3629212" y="3325901"/>
                   <a:ext cx="1166906" cy="508001"/>
                 </a:xfrm>
                 <a:prstGeom prst="rect">
@@ -3337,7 +3337,7 @@
               </p:nvSpPr>
               <p:spPr>
                 <a:xfrm>
-                  <a:off x="3647144" y="5094943"/>
+                  <a:off x="3647144" y="4485328"/>
                   <a:ext cx="1166906" cy="508001"/>
                 </a:xfrm>
                 <a:prstGeom prst="rect">
@@ -3390,7 +3390,7 @@
               </p:nvSpPr>
               <p:spPr>
                 <a:xfrm>
-                  <a:off x="4840943" y="2931459"/>
+                  <a:off x="4840943" y="2838322"/>
                   <a:ext cx="206188" cy="908423"/>
                 </a:xfrm>
                 <a:prstGeom prst="rightBrace">
@@ -3507,8 +3507,8 @@
               </p:nvCxnSpPr>
               <p:spPr>
                 <a:xfrm flipV="1">
-                  <a:off x="3406589" y="2130609"/>
-                  <a:ext cx="204695" cy="484095"/>
+                  <a:off x="3406589" y="2308416"/>
+                  <a:ext cx="204695" cy="306288"/>
                 </a:xfrm>
                 <a:prstGeom prst="bentConnector3">
                   <a:avLst>
@@ -3546,7 +3546,7 @@
               <p:spPr>
                 <a:xfrm>
                   <a:off x="3406589" y="2614704"/>
-                  <a:ext cx="213660" cy="493063"/>
+                  <a:ext cx="213660" cy="391459"/>
                 </a:xfrm>
                 <a:prstGeom prst="bentConnector3">
                   <a:avLst>
@@ -3583,8 +3583,8 @@
               </p:nvCxnSpPr>
               <p:spPr>
                 <a:xfrm flipV="1">
-                  <a:off x="3415554" y="3681506"/>
-                  <a:ext cx="213658" cy="331694"/>
+                  <a:off x="3415554" y="3579902"/>
+                  <a:ext cx="213658" cy="433298"/>
                 </a:xfrm>
                 <a:prstGeom prst="bentConnector3">
                   <a:avLst>
@@ -3622,7 +3622,7 @@
               <p:spPr>
                 <a:xfrm>
                   <a:off x="3415554" y="4013200"/>
-                  <a:ext cx="231590" cy="1335744"/>
+                  <a:ext cx="231590" cy="726129"/>
                 </a:xfrm>
                 <a:prstGeom prst="bentConnector3">
                   <a:avLst>
@@ -3656,10 +3656,10 @@
               </p:nvGrpSpPr>
               <p:grpSpPr>
                 <a:xfrm>
-                  <a:off x="5047131" y="1516902"/>
-                  <a:ext cx="3406580" cy="5249206"/>
-                  <a:chOff x="5047131" y="1516902"/>
-                  <a:chExt cx="3406580" cy="5249206"/>
+                  <a:off x="5047131" y="1703176"/>
+                  <a:ext cx="3406580" cy="4216245"/>
+                  <a:chOff x="5047131" y="1703176"/>
+                  <a:chExt cx="3406580" cy="4216245"/>
                 </a:xfrm>
               </p:grpSpPr>
               <p:grpSp>
@@ -3671,9 +3671,9 @@
                 <p:grpSpPr>
                   <a:xfrm>
                     <a:off x="6938682" y="2765607"/>
-                    <a:ext cx="1515029" cy="1225923"/>
+                    <a:ext cx="1515029" cy="1022715"/>
                     <a:chOff x="5118853" y="2774576"/>
-                    <a:chExt cx="1515029" cy="1225923"/>
+                    <a:chExt cx="1515029" cy="1022715"/>
                   </a:xfrm>
                 </p:grpSpPr>
                 <p:sp>
@@ -3737,7 +3737,7 @@
                   </p:nvSpPr>
                   <p:spPr>
                     <a:xfrm>
-                      <a:off x="5118853" y="3225052"/>
+                      <a:off x="5118853" y="3123448"/>
                       <a:ext cx="1513536" cy="321235"/>
                     </a:xfrm>
                     <a:prstGeom prst="rect">
@@ -3790,7 +3790,7 @@
                   </p:nvSpPr>
                   <p:spPr>
                     <a:xfrm>
-                      <a:off x="5118854" y="3679264"/>
+                      <a:off x="5118854" y="3476056"/>
                       <a:ext cx="1513536" cy="321235"/>
                     </a:xfrm>
                     <a:prstGeom prst="rect">
@@ -3844,7 +3844,7 @@
                 </p:nvSpPr>
                 <p:spPr>
                   <a:xfrm>
-                    <a:off x="5235388" y="1516902"/>
+                    <a:off x="5235388" y="1703176"/>
                     <a:ext cx="1398493" cy="321235"/>
                   </a:xfrm>
                   <a:prstGeom prst="rect">
@@ -3897,7 +3897,7 @@
                 </p:nvSpPr>
                 <p:spPr>
                   <a:xfrm>
-                    <a:off x="5235388" y="1967378"/>
+                    <a:off x="5235388" y="2153652"/>
                     <a:ext cx="1398493" cy="321235"/>
                   </a:xfrm>
                   <a:prstGeom prst="rect">
@@ -3950,7 +3950,7 @@
                 </p:nvSpPr>
                 <p:spPr>
                   <a:xfrm>
-                    <a:off x="5232404" y="2421590"/>
+                    <a:off x="5232404" y="2607864"/>
                     <a:ext cx="1401478" cy="321235"/>
                   </a:xfrm>
                   <a:prstGeom prst="rect">
@@ -4003,10 +4003,10 @@
                 </p:nvGrpSpPr>
                 <p:grpSpPr>
                   <a:xfrm>
-                    <a:off x="6938682" y="4168210"/>
-                    <a:ext cx="1513537" cy="1225923"/>
-                    <a:chOff x="5118853" y="4147670"/>
-                    <a:chExt cx="1513537" cy="1225923"/>
+                    <a:off x="6938682" y="3829535"/>
+                    <a:ext cx="1513537" cy="1031182"/>
+                    <a:chOff x="5118853" y="3808995"/>
+                    <a:chExt cx="1513537" cy="1031182"/>
                   </a:xfrm>
                 </p:grpSpPr>
                 <p:sp>
@@ -4017,7 +4017,7 @@
                   </p:nvSpPr>
                   <p:spPr>
                     <a:xfrm>
-                      <a:off x="5118854" y="4147670"/>
+                      <a:off x="5118854" y="3808995"/>
                       <a:ext cx="1513536" cy="321235"/>
                     </a:xfrm>
                     <a:prstGeom prst="rect">
@@ -4070,7 +4070,7 @@
                   </p:nvSpPr>
                   <p:spPr>
                     <a:xfrm>
-                      <a:off x="5118853" y="4598146"/>
+                      <a:off x="5118853" y="4166334"/>
                       <a:ext cx="1512044" cy="321235"/>
                     </a:xfrm>
                     <a:prstGeom prst="rect">
@@ -4123,7 +4123,7 @@
                   </p:nvSpPr>
                   <p:spPr>
                     <a:xfrm>
-                      <a:off x="5118854" y="5052358"/>
+                      <a:off x="5118854" y="4518942"/>
                       <a:ext cx="1512044" cy="321235"/>
                     </a:xfrm>
                     <a:prstGeom prst="rect">
@@ -4177,7 +4177,7 @@
                 </p:nvSpPr>
                 <p:spPr>
                   <a:xfrm>
-                    <a:off x="5162924" y="3144366"/>
+                    <a:off x="5162924" y="3042762"/>
                     <a:ext cx="1567336" cy="468406"/>
                   </a:xfrm>
                   <a:prstGeom prst="rect">
@@ -4233,8 +4233,8 @@
                 </p:nvCxnSpPr>
                 <p:spPr>
                   <a:xfrm flipV="1">
-                    <a:off x="5047131" y="3378569"/>
-                    <a:ext cx="115793" cy="7102"/>
+                    <a:off x="5047131" y="3276965"/>
+                    <a:ext cx="115793" cy="15569"/>
                   </a:xfrm>
                   <a:prstGeom prst="straightConnector1">
                     <a:avLst/>
@@ -4266,7 +4266,7 @@
                 </p:nvSpPr>
                 <p:spPr>
                   <a:xfrm>
-                    <a:off x="5118475" y="4526791"/>
+                    <a:off x="5118475" y="4086512"/>
                     <a:ext cx="1586750" cy="508001"/>
                   </a:xfrm>
                   <a:prstGeom prst="rect">
@@ -4319,7 +4319,7 @@
                 </p:nvSpPr>
                 <p:spPr>
                   <a:xfrm>
-                    <a:off x="5118475" y="5898019"/>
+                    <a:off x="5118475" y="5152937"/>
                     <a:ext cx="1586750" cy="508001"/>
                   </a:xfrm>
                   <a:prstGeom prst="rect">
@@ -4372,10 +4372,10 @@
                 </p:nvGrpSpPr>
                 <p:grpSpPr>
                   <a:xfrm>
-                    <a:off x="6938682" y="5540185"/>
-                    <a:ext cx="1513537" cy="1225923"/>
-                    <a:chOff x="5118853" y="4147670"/>
-                    <a:chExt cx="1513537" cy="1225923"/>
+                    <a:off x="6938682" y="4896704"/>
+                    <a:ext cx="1513537" cy="1022717"/>
+                    <a:chOff x="5118853" y="3504189"/>
+                    <a:chExt cx="1513537" cy="1022717"/>
                   </a:xfrm>
                 </p:grpSpPr>
                 <p:sp>
@@ -4386,7 +4386,7 @@
                   </p:nvSpPr>
                   <p:spPr>
                     <a:xfrm>
-                      <a:off x="5118854" y="4147670"/>
+                      <a:off x="5118854" y="3504189"/>
                       <a:ext cx="1513536" cy="321235"/>
                     </a:xfrm>
                     <a:prstGeom prst="rect">
@@ -4439,7 +4439,7 @@
                   </p:nvSpPr>
                   <p:spPr>
                     <a:xfrm>
-                      <a:off x="5118853" y="4598146"/>
+                      <a:off x="5118853" y="3853063"/>
                       <a:ext cx="1512044" cy="321235"/>
                     </a:xfrm>
                     <a:prstGeom prst="rect">
@@ -4492,7 +4492,7 @@
                   </p:nvSpPr>
                   <p:spPr>
                     <a:xfrm>
-                      <a:off x="5118854" y="5052358"/>
+                      <a:off x="5118854" y="4205671"/>
                       <a:ext cx="1512044" cy="321235"/>
                     </a:xfrm>
                     <a:prstGeom prst="rect">
@@ -4551,8 +4551,8 @@
             </p:nvCxnSpPr>
             <p:spPr>
               <a:xfrm flipV="1">
-                <a:off x="4778190" y="1677520"/>
-                <a:ext cx="457198" cy="453089"/>
+                <a:off x="4778190" y="1863794"/>
+                <a:ext cx="457198" cy="444622"/>
               </a:xfrm>
               <a:prstGeom prst="bentConnector3">
                 <a:avLst/>
@@ -4586,9 +4586,9 @@
               <p:nvPr/>
             </p:nvCxnSpPr>
             <p:spPr>
-              <a:xfrm flipV="1">
-                <a:off x="4778190" y="2127996"/>
-                <a:ext cx="457198" cy="2613"/>
+              <a:xfrm>
+                <a:off x="4778190" y="2308416"/>
+                <a:ext cx="457198" cy="5854"/>
               </a:xfrm>
               <a:prstGeom prst="bentConnector3">
                 <a:avLst/>
@@ -4623,8 +4623,8 @@
             </p:nvCxnSpPr>
             <p:spPr>
               <a:xfrm>
-                <a:off x="4778190" y="2130609"/>
-                <a:ext cx="454214" cy="451599"/>
+                <a:off x="4778190" y="2308416"/>
+                <a:ext cx="454214" cy="460066"/>
               </a:xfrm>
               <a:prstGeom prst="bentConnector3">
                 <a:avLst/>
@@ -4660,7 +4660,7 @@
             <p:spPr>
               <a:xfrm flipV="1">
                 <a:off x="6730260" y="2926225"/>
-                <a:ext cx="208423" cy="452344"/>
+                <a:ext cx="208423" cy="350740"/>
               </a:xfrm>
               <a:prstGeom prst="bentConnector3">
                 <a:avLst/>
@@ -4695,7 +4695,7 @@
             </p:nvCxnSpPr>
             <p:spPr>
               <a:xfrm flipV="1">
-                <a:off x="6730260" y="3376701"/>
+                <a:off x="6730260" y="3275097"/>
                 <a:ext cx="208422" cy="1868"/>
               </a:xfrm>
               <a:prstGeom prst="bentConnector3">
@@ -4731,8 +4731,8 @@
             </p:nvCxnSpPr>
             <p:spPr>
               <a:xfrm>
-                <a:off x="6730260" y="3378569"/>
-                <a:ext cx="208423" cy="452344"/>
+                <a:off x="6730260" y="3276965"/>
+                <a:ext cx="208423" cy="350740"/>
               </a:xfrm>
               <a:prstGeom prst="bentConnector3">
                 <a:avLst/>
@@ -4767,8 +4767,8 @@
             </p:nvCxnSpPr>
             <p:spPr>
               <a:xfrm flipV="1">
-                <a:off x="6705225" y="4328828"/>
-                <a:ext cx="233458" cy="451964"/>
+                <a:off x="6705225" y="3990153"/>
+                <a:ext cx="233458" cy="350360"/>
               </a:xfrm>
               <a:prstGeom prst="bentConnector3">
                 <a:avLst/>
@@ -4802,9 +4802,9 @@
               <p:nvPr/>
             </p:nvCxnSpPr>
             <p:spPr>
-              <a:xfrm flipV="1">
-                <a:off x="6705225" y="4779304"/>
-                <a:ext cx="233457" cy="1488"/>
+              <a:xfrm>
+                <a:off x="6705225" y="4340513"/>
+                <a:ext cx="233457" cy="6979"/>
               </a:xfrm>
               <a:prstGeom prst="bentConnector3">
                 <a:avLst/>
@@ -4839,8 +4839,8 @@
             </p:nvCxnSpPr>
             <p:spPr>
               <a:xfrm>
-                <a:off x="6705225" y="4780792"/>
-                <a:ext cx="233458" cy="452724"/>
+                <a:off x="6705225" y="4340513"/>
+                <a:ext cx="233458" cy="359587"/>
               </a:xfrm>
               <a:prstGeom prst="bentConnector3">
                 <a:avLst/>
@@ -4875,8 +4875,8 @@
             </p:nvCxnSpPr>
             <p:spPr>
               <a:xfrm flipV="1">
-                <a:off x="6705225" y="5700803"/>
-                <a:ext cx="233458" cy="451217"/>
+                <a:off x="6705225" y="5057322"/>
+                <a:ext cx="233458" cy="349616"/>
               </a:xfrm>
               <a:prstGeom prst="bentConnector3">
                 <a:avLst/>
@@ -4911,8 +4911,8 @@
             </p:nvCxnSpPr>
             <p:spPr>
               <a:xfrm flipV="1">
-                <a:off x="6705225" y="6151279"/>
-                <a:ext cx="233457" cy="741"/>
+                <a:off x="6705225" y="5406196"/>
+                <a:ext cx="233457" cy="742"/>
               </a:xfrm>
               <a:prstGeom prst="bentConnector3">
                 <a:avLst/>
@@ -4947,8 +4947,8 @@
             </p:nvCxnSpPr>
             <p:spPr>
               <a:xfrm>
-                <a:off x="6705225" y="6152020"/>
-                <a:ext cx="233458" cy="453471"/>
+                <a:off x="6705225" y="5406938"/>
+                <a:ext cx="233458" cy="351866"/>
               </a:xfrm>
               <a:prstGeom prst="bentConnector3">
                 <a:avLst/>
@@ -4983,8 +4983,8 @@
             </p:nvCxnSpPr>
             <p:spPr>
               <a:xfrm flipV="1">
-                <a:off x="4814050" y="4780792"/>
-                <a:ext cx="304425" cy="568152"/>
+                <a:off x="4814050" y="4340513"/>
+                <a:ext cx="304425" cy="398816"/>
               </a:xfrm>
               <a:prstGeom prst="bentConnector3">
                 <a:avLst/>
@@ -5019,8 +5019,8 @@
             </p:nvCxnSpPr>
             <p:spPr>
               <a:xfrm>
-                <a:off x="4814050" y="5348944"/>
-                <a:ext cx="304425" cy="803076"/>
+                <a:off x="4814050" y="4739329"/>
+                <a:ext cx="304425" cy="667609"/>
               </a:xfrm>
               <a:prstGeom prst="bentConnector3">
                 <a:avLst/>
@@ -5053,7 +5053,7 @@
           </p:nvSpPr>
           <p:spPr>
             <a:xfrm>
-              <a:off x="6122894" y="769066"/>
+              <a:off x="6122894" y="955340"/>
               <a:ext cx="3272118" cy="560298"/>
             </a:xfrm>
             <a:prstGeom prst="rect">
@@ -5114,7 +5114,7 @@
           </p:nvSpPr>
           <p:spPr>
             <a:xfrm>
-              <a:off x="6122894" y="1386713"/>
+              <a:off x="6122894" y="1572987"/>
               <a:ext cx="3272118" cy="349250"/>
             </a:xfrm>
             <a:prstGeom prst="rect">
@@ -5178,7 +5178,7 @@
           </p:nvCxnSpPr>
           <p:spPr>
             <a:xfrm>
-              <a:off x="5818093" y="926904"/>
+              <a:off x="5818093" y="1113178"/>
               <a:ext cx="304801" cy="122311"/>
             </a:xfrm>
             <a:prstGeom prst="straightConnector1">
@@ -5214,7 +5214,7 @@
           </p:nvCxnSpPr>
           <p:spPr>
             <a:xfrm flipV="1">
-              <a:off x="5818093" y="1049215"/>
+              <a:off x="5818093" y="1235489"/>
               <a:ext cx="304801" cy="328165"/>
             </a:xfrm>
             <a:prstGeom prst="straightConnector1">
@@ -5250,7 +5250,7 @@
           </p:nvCxnSpPr>
           <p:spPr>
             <a:xfrm flipV="1">
-              <a:off x="5818094" y="1561338"/>
+              <a:off x="5818094" y="1747612"/>
               <a:ext cx="304800" cy="270254"/>
             </a:xfrm>
             <a:prstGeom prst="straightConnector1">
@@ -5283,7 +5283,7 @@
           </p:nvSpPr>
           <p:spPr>
             <a:xfrm>
-              <a:off x="8014446" y="2093617"/>
+              <a:off x="8014446" y="2000480"/>
               <a:ext cx="2883654" cy="560298"/>
             </a:xfrm>
             <a:prstGeom prst="rect">
@@ -5344,7 +5344,7 @@
           </p:nvSpPr>
           <p:spPr>
             <a:xfrm>
-              <a:off x="8014446" y="2815994"/>
+              <a:off x="8014446" y="2705923"/>
               <a:ext cx="2883654" cy="336021"/>
             </a:xfrm>
             <a:prstGeom prst="rect">
@@ -5409,7 +5409,7 @@
           <p:spPr>
             <a:xfrm>
               <a:off x="7637923" y="2175609"/>
-              <a:ext cx="376523" cy="198157"/>
+              <a:ext cx="376523" cy="105020"/>
             </a:xfrm>
             <a:prstGeom prst="straightConnector1">
               <a:avLst/>
@@ -5444,8 +5444,8 @@
           </p:nvCxnSpPr>
           <p:spPr>
             <a:xfrm flipV="1">
-              <a:off x="7636430" y="2373766"/>
-              <a:ext cx="378016" cy="252319"/>
+              <a:off x="7636430" y="2280629"/>
+              <a:ext cx="378016" cy="243852"/>
             </a:xfrm>
             <a:prstGeom prst="straightConnector1">
               <a:avLst/>
@@ -5480,8 +5480,8 @@
           </p:nvCxnSpPr>
           <p:spPr>
             <a:xfrm flipV="1">
-              <a:off x="7636431" y="2984005"/>
-              <a:ext cx="378015" cy="96292"/>
+              <a:off x="7636431" y="2873934"/>
+              <a:ext cx="378015" cy="3155"/>
             </a:xfrm>
             <a:prstGeom prst="straightConnector1">
               <a:avLst/>
@@ -5513,7 +5513,7 @@
           </p:nvSpPr>
           <p:spPr>
             <a:xfrm>
-              <a:off x="8013319" y="3500401"/>
+              <a:off x="8013319" y="3136332"/>
               <a:ext cx="2883654" cy="560298"/>
             </a:xfrm>
             <a:prstGeom prst="rect">
@@ -5574,7 +5574,7 @@
           </p:nvSpPr>
           <p:spPr>
             <a:xfrm>
-              <a:off x="8013319" y="4222778"/>
+              <a:off x="8013319" y="3790976"/>
               <a:ext cx="2883654" cy="566791"/>
             </a:xfrm>
             <a:prstGeom prst="rect">
@@ -5638,8 +5638,8 @@
           </p:nvCxnSpPr>
           <p:spPr>
             <a:xfrm>
-              <a:off x="7636431" y="3578212"/>
-              <a:ext cx="376888" cy="202338"/>
+              <a:off x="7636431" y="3239537"/>
+              <a:ext cx="376888" cy="176944"/>
             </a:xfrm>
             <a:prstGeom prst="straightConnector1">
               <a:avLst/>
@@ -5674,8 +5674,8 @@
           </p:nvCxnSpPr>
           <p:spPr>
             <a:xfrm flipV="1">
-              <a:off x="7634938" y="3780550"/>
-              <a:ext cx="378381" cy="248138"/>
+              <a:off x="7634938" y="3416481"/>
+              <a:ext cx="378381" cy="180395"/>
             </a:xfrm>
             <a:prstGeom prst="straightConnector1">
               <a:avLst/>
@@ -5710,8 +5710,8 @@
           </p:nvCxnSpPr>
           <p:spPr>
             <a:xfrm>
-              <a:off x="7634939" y="4482900"/>
-              <a:ext cx="378380" cy="23274"/>
+              <a:off x="7634939" y="3949484"/>
+              <a:ext cx="378380" cy="124888"/>
             </a:xfrm>
             <a:prstGeom prst="straightConnector1">
               <a:avLst/>
@@ -5743,7 +5743,7 @@
           </p:nvSpPr>
           <p:spPr>
             <a:xfrm>
-              <a:off x="8013319" y="5120513"/>
+              <a:off x="8013319" y="4493975"/>
               <a:ext cx="2883654" cy="560298"/>
             </a:xfrm>
             <a:prstGeom prst="rect">
@@ -5807,8 +5807,8 @@
           </p:nvCxnSpPr>
           <p:spPr>
             <a:xfrm>
-              <a:off x="7636431" y="4950187"/>
-              <a:ext cx="376888" cy="450475"/>
+              <a:off x="7636431" y="4306706"/>
+              <a:ext cx="376888" cy="467418"/>
             </a:xfrm>
             <a:prstGeom prst="straightConnector1">
               <a:avLst/>
@@ -5842,9 +5842,9 @@
             <p:nvPr/>
           </p:nvCxnSpPr>
           <p:spPr>
-            <a:xfrm flipV="1">
-              <a:off x="7634938" y="5400662"/>
-              <a:ext cx="378381" cy="1"/>
+            <a:xfrm>
+              <a:off x="7634938" y="4655580"/>
+              <a:ext cx="378381" cy="118544"/>
             </a:xfrm>
             <a:prstGeom prst="straightConnector1">
               <a:avLst/>
@@ -5879,8 +5879,8 @@
           </p:nvCxnSpPr>
           <p:spPr>
             <a:xfrm flipV="1">
-              <a:off x="7634939" y="5400662"/>
-              <a:ext cx="378380" cy="454213"/>
+              <a:off x="7634939" y="4774124"/>
+              <a:ext cx="378380" cy="234064"/>
             </a:xfrm>
             <a:prstGeom prst="straightConnector1">
               <a:avLst/>
@@ -5913,7 +5913,7 @@
         </p:nvGrpSpPr>
         <p:grpSpPr>
           <a:xfrm>
-            <a:off x="106077" y="3931954"/>
+            <a:off x="72209" y="2865136"/>
             <a:ext cx="3157364" cy="1428288"/>
             <a:chOff x="267445" y="4200894"/>
             <a:chExt cx="3157364" cy="1428288"/>

</xml_diff>